<commit_message>
NEW PPTX file addition via upload
</commit_message>
<xml_diff>
--- a/ppt StuBudgtTrackr PROJECT.pptx
+++ b/ppt StuBudgtTrackr PROJECT.pptx
@@ -133,6 +133,7 @@
 <p1510:revInfo xmlns:a="http://schemas.openxmlformats.org/drawingml/2006/main" xmlns:r="http://schemas.openxmlformats.org/officeDocument/2006/relationships" xmlns:p1510="http://schemas.microsoft.com/office/powerpoint/2015/10/main">
   <p1510:revLst>
     <p1510:client id="{A94DD75C-1D9B-4829-A4C6-D12C22B9518E}" v="12" dt="2025-11-30T20:18:26.958"/>
+    <p1510:client id="{C81D8114-88DE-48DA-A264-3F47EAA5A8F3}" v="2" dt="2025-11-30T20:46:12.307"/>
   </p1510:revLst>
 </p1510:revInfo>
 </file>
@@ -142,12 +143,12 @@
   <pc:docChgLst>
     <pc:chgData name="Maryjane Ede" userId="4a12d55359b15878" providerId="LiveId" clId="{A442BEB5-15E6-495F-B86A-8887FDD472F2}"/>
     <pc:docChg chg="undo custSel modSld">
-      <pc:chgData name="Maryjane Ede" userId="4a12d55359b15878" providerId="LiveId" clId="{A442BEB5-15E6-495F-B86A-8887FDD472F2}" dt="2025-11-30T20:20:17.112" v="714" actId="1076"/>
+      <pc:chgData name="Maryjane Ede" userId="4a12d55359b15878" providerId="LiveId" clId="{A442BEB5-15E6-495F-B86A-8887FDD472F2}" dt="2025-11-30T20:47:11.337" v="731" actId="20577"/>
       <pc:docMkLst>
         <pc:docMk/>
       </pc:docMkLst>
       <pc:sldChg chg="addSp modSp mod">
-        <pc:chgData name="Maryjane Ede" userId="4a12d55359b15878" providerId="LiveId" clId="{A442BEB5-15E6-495F-B86A-8887FDD472F2}" dt="2025-11-30T20:20:17.112" v="714" actId="1076"/>
+        <pc:chgData name="Maryjane Ede" userId="4a12d55359b15878" providerId="LiveId" clId="{A442BEB5-15E6-495F-B86A-8887FDD472F2}" dt="2025-11-30T20:47:11.337" v="731" actId="20577"/>
         <pc:sldMkLst>
           <pc:docMk/>
           <pc:sldMk cId="0" sldId="256"/>
@@ -169,7 +170,7 @@
           </ac:spMkLst>
         </pc:spChg>
         <pc:spChg chg="add mod">
-          <ac:chgData name="Maryjane Ede" userId="4a12d55359b15878" providerId="LiveId" clId="{A442BEB5-15E6-495F-B86A-8887FDD472F2}" dt="2025-11-30T20:20:17.112" v="714" actId="1076"/>
+          <ac:chgData name="Maryjane Ede" userId="4a12d55359b15878" providerId="LiveId" clId="{A442BEB5-15E6-495F-B86A-8887FDD472F2}" dt="2025-11-30T20:47:11.337" v="731" actId="20577"/>
           <ac:spMkLst>
             <pc:docMk/>
             <pc:sldMk cId="0" sldId="256"/>
@@ -370,7 +371,7 @@
             <a:fld id="{1D8BD707-D9CF-40AE-B4C6-C98DA3205C09}" type="datetimeFigureOut">
               <a:rPr lang="en-US" smtClean="0"/>
               <a:pPr/>
-              <a:t>11/29/2025</a:t>
+              <a:t>11/30/2025</a:t>
             </a:fld>
             <a:endParaRPr lang="en-US"/>
           </a:p>
@@ -535,7 +536,7 @@
             <a:fld id="{1D8BD707-D9CF-40AE-B4C6-C98DA3205C09}" type="datetimeFigureOut">
               <a:rPr lang="en-US" smtClean="0"/>
               <a:pPr/>
-              <a:t>11/29/2025</a:t>
+              <a:t>11/30/2025</a:t>
             </a:fld>
             <a:endParaRPr lang="en-US"/>
           </a:p>
@@ -710,7 +711,7 @@
             <a:fld id="{1D8BD707-D9CF-40AE-B4C6-C98DA3205C09}" type="datetimeFigureOut">
               <a:rPr lang="en-US" smtClean="0"/>
               <a:pPr/>
-              <a:t>11/29/2025</a:t>
+              <a:t>11/30/2025</a:t>
             </a:fld>
             <a:endParaRPr lang="en-US"/>
           </a:p>
@@ -875,7 +876,7 @@
             <a:fld id="{1D8BD707-D9CF-40AE-B4C6-C98DA3205C09}" type="datetimeFigureOut">
               <a:rPr lang="en-US" smtClean="0"/>
               <a:pPr/>
-              <a:t>11/29/2025</a:t>
+              <a:t>11/30/2025</a:t>
             </a:fld>
             <a:endParaRPr lang="en-US"/>
           </a:p>
@@ -1117,7 +1118,7 @@
             <a:fld id="{1D8BD707-D9CF-40AE-B4C6-C98DA3205C09}" type="datetimeFigureOut">
               <a:rPr lang="en-US" smtClean="0"/>
               <a:pPr/>
-              <a:t>11/29/2025</a:t>
+              <a:t>11/30/2025</a:t>
             </a:fld>
             <a:endParaRPr lang="en-US"/>
           </a:p>
@@ -1399,7 +1400,7 @@
             <a:fld id="{1D8BD707-D9CF-40AE-B4C6-C98DA3205C09}" type="datetimeFigureOut">
               <a:rPr lang="en-US" smtClean="0"/>
               <a:pPr/>
-              <a:t>11/29/2025</a:t>
+              <a:t>11/30/2025</a:t>
             </a:fld>
             <a:endParaRPr lang="en-US"/>
           </a:p>
@@ -1815,7 +1816,7 @@
             <a:fld id="{1D8BD707-D9CF-40AE-B4C6-C98DA3205C09}" type="datetimeFigureOut">
               <a:rPr lang="en-US" smtClean="0"/>
               <a:pPr/>
-              <a:t>11/29/2025</a:t>
+              <a:t>11/30/2025</a:t>
             </a:fld>
             <a:endParaRPr lang="en-US"/>
           </a:p>
@@ -1929,7 +1930,7 @@
             <a:fld id="{1D8BD707-D9CF-40AE-B4C6-C98DA3205C09}" type="datetimeFigureOut">
               <a:rPr lang="en-US" smtClean="0"/>
               <a:pPr/>
-              <a:t>11/29/2025</a:t>
+              <a:t>11/30/2025</a:t>
             </a:fld>
             <a:endParaRPr lang="en-US"/>
           </a:p>
@@ -2021,7 +2022,7 @@
             <a:fld id="{1D8BD707-D9CF-40AE-B4C6-C98DA3205C09}" type="datetimeFigureOut">
               <a:rPr lang="en-US" smtClean="0"/>
               <a:pPr/>
-              <a:t>11/29/2025</a:t>
+              <a:t>11/30/2025</a:t>
             </a:fld>
             <a:endParaRPr lang="en-US"/>
           </a:p>
@@ -2293,7 +2294,7 @@
             <a:fld id="{1D8BD707-D9CF-40AE-B4C6-C98DA3205C09}" type="datetimeFigureOut">
               <a:rPr lang="en-US" smtClean="0"/>
               <a:pPr/>
-              <a:t>11/29/2025</a:t>
+              <a:t>11/30/2025</a:t>
             </a:fld>
             <a:endParaRPr lang="en-US"/>
           </a:p>
@@ -2542,7 +2543,7 @@
             <a:fld id="{1D8BD707-D9CF-40AE-B4C6-C98DA3205C09}" type="datetimeFigureOut">
               <a:rPr lang="en-US" smtClean="0"/>
               <a:pPr/>
-              <a:t>11/29/2025</a:t>
+              <a:t>11/30/2025</a:t>
             </a:fld>
             <a:endParaRPr lang="en-US"/>
           </a:p>
@@ -2750,7 +2751,7 @@
             <a:fld id="{1D8BD707-D9CF-40AE-B4C6-C98DA3205C09}" type="datetimeFigureOut">
               <a:rPr lang="en-US" smtClean="0"/>
               <a:pPr/>
-              <a:t>11/29/2025</a:t>
+              <a:t>11/30/2025</a:t>
             </a:fld>
             <a:endParaRPr lang="en-US"/>
           </a:p>
@@ -7158,7 +7159,7 @@
         <p:spPr>
           <a:xfrm>
             <a:off x="12762366" y="2374546"/>
-            <a:ext cx="4872811" cy="5078313"/>
+            <a:ext cx="4872811" cy="5170646"/>
           </a:xfrm>
           <a:prstGeom prst="rect">
             <a:avLst/>
@@ -7185,7 +7186,7 @@
           <a:lstStyle/>
           <a:p>
             <a:r>
-              <a:rPr lang="en-US" sz="3600" dirty="0">
+              <a:rPr lang="en-US" sz="3300" dirty="0">
                 <a:ln w="0"/>
                 <a:solidFill>
                   <a:schemeClr val="accent1"/>
@@ -7200,7 +7201,59 @@
               </a:rPr>
               <a:t>People, especially students, can use this budget to input their expense and income throughout the month and the program will help you keep track of when and on what you are spending money on.</a:t>
             </a:r>
-            <a:endParaRPr lang="en-US" dirty="0">
+          </a:p>
+          <a:p>
+            <a:r>
+              <a:rPr lang="en-US" sz="3300" dirty="0">
+                <a:ln w="0"/>
+                <a:solidFill>
+                  <a:schemeClr val="accent1"/>
+                </a:solidFill>
+                <a:effectLst>
+                  <a:outerShdw blurRad="38100" dist="25400" dir="5400000" algn="ctr" rotWithShape="0">
+                    <a:srgbClr val="6E747A">
+                      <a:alpha val="43000"/>
+                    </a:srgbClr>
+                  </a:outerShdw>
+                </a:effectLst>
+                <a:hlinkClick r:id="rId34"/>
+              </a:rPr>
+              <a:t>https://github.com/ksu-is/</a:t>
+            </a:r>
+            <a:r>
+              <a:rPr lang="en-US" sz="3300">
+                <a:ln w="0"/>
+                <a:solidFill>
+                  <a:schemeClr val="accent1"/>
+                </a:solidFill>
+                <a:effectLst>
+                  <a:outerShdw blurRad="38100" dist="25400" dir="5400000" algn="ctr" rotWithShape="0">
+                    <a:srgbClr val="6E747A">
+                      <a:alpha val="43000"/>
+                    </a:srgbClr>
+                  </a:outerShdw>
+                </a:effectLst>
+                <a:hlinkClick r:id="rId34"/>
+              </a:rPr>
+              <a:t>Student-Budget-Tracker</a:t>
+            </a:r>
+            <a:r>
+              <a:rPr lang="en-US" sz="3300">
+                <a:ln w="0"/>
+                <a:solidFill>
+                  <a:schemeClr val="accent1"/>
+                </a:solidFill>
+                <a:effectLst>
+                  <a:outerShdw blurRad="38100" dist="25400" dir="5400000" algn="ctr" rotWithShape="0">
+                    <a:srgbClr val="6E747A">
+                      <a:alpha val="43000"/>
+                    </a:srgbClr>
+                  </a:outerShdw>
+                </a:effectLst>
+              </a:rPr>
+              <a:t> </a:t>
+            </a:r>
+            <a:endParaRPr lang="en-US" sz="3300" dirty="0">
               <a:ln w="0"/>
               <a:solidFill>
                 <a:schemeClr val="accent1"/>

</xml_diff>